<commit_message>
[Global] : correction petits bogues
</commit_message>
<xml_diff>
--- a/Docs/Soutenance Projet.pptx
+++ b/Docs/Soutenance Projet.pptx
@@ -5,7 +5,7 @@
     <p:sldMasterId id="2147483756" r:id="rId1"/>
   </p:sldMasterIdLst>
   <p:notesMasterIdLst>
-    <p:notesMasterId r:id="rId8"/>
+    <p:notesMasterId r:id="rId9"/>
   </p:notesMasterIdLst>
   <p:sldIdLst>
     <p:sldId id="256" r:id="rId2"/>
@@ -14,6 +14,7 @@
     <p:sldId id="282" r:id="rId5"/>
     <p:sldId id="264" r:id="rId6"/>
     <p:sldId id="287" r:id="rId7"/>
+    <p:sldId id="289" r:id="rId8"/>
   </p:sldIdLst>
   <p:sldSz cx="9144000" cy="6858000" type="screen4x3"/>
   <p:notesSz cx="6858000" cy="9144000"/>
@@ -5993,7 +5994,7 @@
           <a:p>
             <a:fld id="{6D22F626-CA3F-4489-8656-094F9D88488D}" type="datetimeFigureOut">
               <a:rPr lang="fr-FR" smtClean="0"/>
-              <a:t>17/01/2015</a:t>
+              <a:t>19/01/2015</a:t>
             </a:fld>
             <a:endParaRPr lang="fr-FR"/>
           </a:p>
@@ -6345,6 +6346,90 @@
 </p:notes>
 </file>
 
+<file path=ppt/notesSlides/notesSlide2.xml><?xml version="1.0" encoding="utf-8"?>
+<p:notes xmlns:a="http://schemas.openxmlformats.org/drawingml/2006/main" xmlns:r="http://schemas.openxmlformats.org/officeDocument/2006/relationships" xmlns:p="http://schemas.openxmlformats.org/presentationml/2006/main">
+  <p:cSld>
+    <p:spTree>
+      <p:nvGrpSpPr>
+        <p:cNvPr id="1" name=""/>
+        <p:cNvGrpSpPr/>
+        <p:nvPr/>
+      </p:nvGrpSpPr>
+      <p:grpSpPr>
+        <a:xfrm>
+          <a:off x="0" y="0"/>
+          <a:ext cx="0" cy="0"/>
+          <a:chOff x="0" y="0"/>
+          <a:chExt cx="0" cy="0"/>
+        </a:xfrm>
+      </p:grpSpPr>
+      <p:sp>
+        <p:nvSpPr>
+          <p:cNvPr id="2" name="Espace réservé de l'image des diapositives 1"/>
+          <p:cNvSpPr>
+            <a:spLocks noGrp="1" noRot="1" noChangeAspect="1"/>
+          </p:cNvSpPr>
+          <p:nvPr>
+            <p:ph type="sldImg"/>
+          </p:nvPr>
+        </p:nvSpPr>
+        <p:spPr/>
+      </p:sp>
+      <p:sp>
+        <p:nvSpPr>
+          <p:cNvPr id="3" name="Espace réservé des commentaires 2"/>
+          <p:cNvSpPr>
+            <a:spLocks noGrp="1"/>
+          </p:cNvSpPr>
+          <p:nvPr>
+            <p:ph type="body" idx="1"/>
+          </p:nvPr>
+        </p:nvSpPr>
+        <p:spPr/>
+        <p:txBody>
+          <a:bodyPr/>
+          <a:lstStyle/>
+          <a:p>
+            <a:endParaRPr lang="fr-FR" dirty="0"/>
+          </a:p>
+        </p:txBody>
+      </p:sp>
+      <p:sp>
+        <p:nvSpPr>
+          <p:cNvPr id="4" name="Espace réservé du numéro de diapositive 3"/>
+          <p:cNvSpPr>
+            <a:spLocks noGrp="1"/>
+          </p:cNvSpPr>
+          <p:nvPr>
+            <p:ph type="sldNum" sz="quarter" idx="10"/>
+          </p:nvPr>
+        </p:nvSpPr>
+        <p:spPr/>
+        <p:txBody>
+          <a:bodyPr/>
+          <a:lstStyle/>
+          <a:p>
+            <a:fld id="{BF577B26-A8E1-4E17-A245-5A3862DA6E92}" type="slidenum">
+              <a:rPr lang="fr-FR" smtClean="0"/>
+              <a:t>7</a:t>
+            </a:fld>
+            <a:endParaRPr lang="fr-FR"/>
+          </a:p>
+        </p:txBody>
+      </p:sp>
+    </p:spTree>
+    <p:extLst>
+      <p:ext uri="{BB962C8B-B14F-4D97-AF65-F5344CB8AC3E}">
+        <p14:creationId xmlns:p14="http://schemas.microsoft.com/office/powerpoint/2010/main" val="3597575720"/>
+      </p:ext>
+    </p:extLst>
+  </p:cSld>
+  <p:clrMapOvr>
+    <a:masterClrMapping/>
+  </p:clrMapOvr>
+</p:notes>
+</file>
+
 <file path=ppt/slideLayouts/slideLayout1.xml><?xml version="1.0" encoding="utf-8"?>
 <p:sldLayout xmlns:a="http://schemas.openxmlformats.org/drawingml/2006/main" xmlns:r="http://schemas.openxmlformats.org/officeDocument/2006/relationships" xmlns:p="http://schemas.openxmlformats.org/presentationml/2006/main" showMasterSp="0" type="title" preserve="1">
   <p:cSld name="Diapositive de titre">
@@ -6539,7 +6624,7 @@
           <a:p>
             <a:fld id="{F6ED821C-3065-4F4D-B16E-1BFEE8A77605}" type="datetime1">
               <a:rPr lang="fr-FR" smtClean="0"/>
-              <a:t>17/01/2015</a:t>
+              <a:t>19/01/2015</a:t>
             </a:fld>
             <a:endParaRPr lang="fr-FR"/>
           </a:p>
@@ -6893,7 +6978,7 @@
           <a:p>
             <a:fld id="{22A5C57C-3584-43B6-A3E2-08F245098A9D}" type="datetime1">
               <a:rPr lang="fr-FR" smtClean="0"/>
-              <a:t>17/01/2015</a:t>
+              <a:t>19/01/2015</a:t>
             </a:fld>
             <a:endParaRPr lang="fr-FR"/>
           </a:p>
@@ -7069,7 +7154,7 @@
           <a:p>
             <a:fld id="{4EE43607-FA03-4550-8145-20691F15E831}" type="datetime1">
               <a:rPr lang="fr-FR" smtClean="0"/>
-              <a:t>17/01/2015</a:t>
+              <a:t>19/01/2015</a:t>
             </a:fld>
             <a:endParaRPr lang="fr-FR"/>
           </a:p>
@@ -7183,7 +7268,7 @@
           <a:p>
             <a:fld id="{FA3BB2BD-9988-42C2-B189-1BD153E9EB2A}" type="datetime1">
               <a:rPr lang="fr-FR" smtClean="0"/>
-              <a:t>17/01/2015</a:t>
+              <a:t>19/01/2015</a:t>
             </a:fld>
             <a:endParaRPr lang="fr-FR"/>
           </a:p>
@@ -7542,7 +7627,7 @@
           <a:p>
             <a:fld id="{5626FA85-4640-4B84-940B-84733AD45A67}" type="datetime1">
               <a:rPr lang="fr-FR" smtClean="0"/>
-              <a:t>17/01/2015</a:t>
+              <a:t>19/01/2015</a:t>
             </a:fld>
             <a:endParaRPr lang="fr-FR"/>
           </a:p>
@@ -7808,7 +7893,7 @@
           <a:p>
             <a:fld id="{E6AEA758-39C2-4EAC-A504-1F705BDACDC2}" type="datetime1">
               <a:rPr lang="fr-FR" smtClean="0"/>
-              <a:t>17/01/2015</a:t>
+              <a:t>19/01/2015</a:t>
             </a:fld>
             <a:endParaRPr lang="fr-FR"/>
           </a:p>
@@ -8171,7 +8256,7 @@
           <a:p>
             <a:fld id="{F53D1889-12E2-4B2F-A007-C79FC00FDFD8}" type="datetime1">
               <a:rPr lang="fr-FR" smtClean="0"/>
-              <a:t>17/01/2015</a:t>
+              <a:t>19/01/2015</a:t>
             </a:fld>
             <a:endParaRPr lang="fr-FR"/>
           </a:p>
@@ -8399,7 +8484,7 @@
           <a:p>
             <a:fld id="{507A5206-0619-42FB-96E5-3137984AC47A}" type="datetime1">
               <a:rPr lang="fr-FR" smtClean="0"/>
-              <a:t>17/01/2015</a:t>
+              <a:t>19/01/2015</a:t>
             </a:fld>
             <a:endParaRPr lang="fr-FR"/>
           </a:p>
@@ -8490,7 +8575,7 @@
           <a:p>
             <a:fld id="{0D3734FC-6126-40DE-9F53-ADBD9695A324}" type="datetime1">
               <a:rPr lang="fr-FR" smtClean="0"/>
-              <a:t>17/01/2015</a:t>
+              <a:t>19/01/2015</a:t>
             </a:fld>
             <a:endParaRPr lang="fr-FR"/>
           </a:p>
@@ -8758,7 +8843,7 @@
           <a:p>
             <a:fld id="{6D0C46B6-5E63-4B0A-9BFD-796CBFA660A4}" type="datetime1">
               <a:rPr lang="fr-FR" smtClean="0"/>
-              <a:t>17/01/2015</a:t>
+              <a:t>19/01/2015</a:t>
             </a:fld>
             <a:endParaRPr lang="fr-FR"/>
           </a:p>
@@ -8987,7 +9072,7 @@
           <a:p>
             <a:fld id="{66E1D7F5-4BAC-4334-B519-C5B55C061427}" type="datetime1">
               <a:rPr lang="fr-FR" smtClean="0"/>
-              <a:t>17/01/2015</a:t>
+              <a:t>19/01/2015</a:t>
             </a:fld>
             <a:endParaRPr lang="fr-FR"/>
           </a:p>
@@ -9487,7 +9572,7 @@
           <a:p>
             <a:fld id="{FA5025D5-0E1A-4A88-8E59-EA73C3D56A74}" type="datetime1">
               <a:rPr lang="fr-FR" smtClean="0"/>
-              <a:t>17/01/2015</a:t>
+              <a:t>19/01/2015</a:t>
             </a:fld>
             <a:endParaRPr lang="fr-FR"/>
           </a:p>
@@ -10159,7 +10244,7 @@
             </a:fld>
             <a:r>
               <a:rPr lang="fr-FR" dirty="0" smtClean="0"/>
-              <a:t>/</a:t>
+              <a:t>/7</a:t>
             </a:r>
             <a:endParaRPr lang="fr-FR" dirty="0"/>
           </a:p>
@@ -10302,14 +10387,9 @@
   <p:clrMapOvr>
     <a:masterClrMapping/>
   </p:clrMapOvr>
-  <mc:AlternateContent xmlns:mc="http://schemas.openxmlformats.org/markup-compatibility/2006" xmlns:p14="http://schemas.microsoft.com/office/powerpoint/2010/main">
-    <mc:Choice Requires="p14">
-      <p:transition p14:dur="0"/>
-    </mc:Choice>
-    <mc:Fallback xmlns="">
-      <p:transition/>
-    </mc:Fallback>
-  </mc:AlternateContent>
+  <p:transition spd="slow">
+    <p:push dir="u"/>
+  </p:transition>
   <p:timing>
     <p:tnLst>
       <p:par>
@@ -10406,7 +10486,11 @@
               <a:pPr/>
               <a:t>3</a:t>
             </a:fld>
-            <a:endParaRPr lang="fr-FR"/>
+            <a:r>
+              <a:rPr lang="fr-FR" dirty="0" smtClean="0"/>
+              <a:t>/7</a:t>
+            </a:r>
+            <a:endParaRPr lang="fr-FR" dirty="0"/>
           </a:p>
         </p:txBody>
       </p:sp>
@@ -10445,6 +10529,9 @@
   <p:clrMapOvr>
     <a:masterClrMapping/>
   </p:clrMapOvr>
+  <p:transition spd="slow">
+    <p:push dir="u"/>
+  </p:transition>
   <p:timing>
     <p:tnLst>
       <p:par>
@@ -10552,7 +10639,11 @@
               <a:pPr/>
               <a:t>4</a:t>
             </a:fld>
-            <a:endParaRPr lang="fr-FR"/>
+            <a:r>
+              <a:rPr lang="fr-FR" dirty="0" smtClean="0"/>
+              <a:t>/7</a:t>
+            </a:r>
+            <a:endParaRPr lang="fr-FR" dirty="0"/>
           </a:p>
         </p:txBody>
       </p:sp>
@@ -10678,6 +10769,9 @@
   <p:clrMapOvr>
     <a:masterClrMapping/>
   </p:clrMapOvr>
+  <p:transition spd="slow">
+    <p:push dir="u"/>
+  </p:transition>
   <p:timing>
     <p:tnLst>
       <p:par>
@@ -10762,7 +10856,11 @@
               <a:pPr/>
               <a:t>5</a:t>
             </a:fld>
-            <a:endParaRPr lang="fr-FR"/>
+            <a:r>
+              <a:rPr lang="fr-FR" dirty="0" smtClean="0"/>
+              <a:t>/7</a:t>
+            </a:r>
+            <a:endParaRPr lang="fr-FR" dirty="0"/>
           </a:p>
         </p:txBody>
       </p:sp>
@@ -10857,14 +10955,9 @@
   <p:clrMapOvr>
     <a:masterClrMapping/>
   </p:clrMapOvr>
-  <mc:AlternateContent xmlns:mc="http://schemas.openxmlformats.org/markup-compatibility/2006" xmlns:p14="http://schemas.microsoft.com/office/powerpoint/2010/main">
-    <mc:Choice Requires="p14">
-      <p:transition p14:dur="0"/>
-    </mc:Choice>
-    <mc:Fallback xmlns="">
-      <p:transition/>
-    </mc:Fallback>
-  </mc:AlternateContent>
+  <p:transition spd="slow">
+    <p:push dir="u"/>
+  </p:transition>
   <p:timing>
     <p:tnLst>
       <p:par>
@@ -10950,7 +11043,11 @@
               <a:pPr/>
               <a:t>6</a:t>
             </a:fld>
-            <a:endParaRPr lang="fr-FR"/>
+            <a:r>
+              <a:rPr lang="fr-FR" dirty="0" smtClean="0"/>
+              <a:t>/7</a:t>
+            </a:r>
+            <a:endParaRPr lang="fr-FR" dirty="0"/>
           </a:p>
         </p:txBody>
       </p:sp>
@@ -10969,11 +11066,19 @@
           <a:bodyPr/>
           <a:lstStyle/>
           <a:p>
+            <a:pPr>
+              <a:buFont typeface="Arial" charset="0"/>
+              <a:buChar char="•"/>
+            </a:pPr>
             <a:r>
               <a:rPr lang="fr-FR" dirty="0" smtClean="0"/>
-              <a:t>Accéder à la page web : </a:t>
-            </a:r>
-            <a:endParaRPr lang="fr-FR" dirty="0"/>
+              <a:t>Accéder </a:t>
+            </a:r>
+            <a:r>
+              <a:rPr lang="fr-FR" dirty="0" smtClean="0"/>
+              <a:t>à la page web : </a:t>
+            </a:r>
+            <a:endParaRPr lang="fr-FR" dirty="0" smtClean="0"/>
           </a:p>
           <a:p>
             <a:pPr marL="0" indent="0" algn="ctr">
@@ -10983,7 +11088,19 @@
               <a:rPr lang="fr-FR" dirty="0" smtClean="0">
                 <a:hlinkClick r:id="rId3"/>
               </a:rPr>
-              <a:t>http://localhost/Projet-R-D/Site/index.php</a:t>
+              <a:t>http</a:t>
+            </a:r>
+            <a:r>
+              <a:rPr lang="fr-FR" dirty="0" smtClean="0">
+                <a:hlinkClick r:id="rId3"/>
+              </a:rPr>
+              <a:t>://</a:t>
+            </a:r>
+            <a:r>
+              <a:rPr lang="fr-FR" dirty="0" smtClean="0">
+                <a:hlinkClick r:id="rId3"/>
+              </a:rPr>
+              <a:t>localhost/Projet-R-D/Site/index.php</a:t>
             </a:r>
             <a:endParaRPr lang="fr-FR" dirty="0" smtClean="0"/>
           </a:p>
@@ -11017,6 +11134,187 @@
   <p:clrMapOvr>
     <a:masterClrMapping/>
   </p:clrMapOvr>
+  <p:transition spd="slow">
+    <p:push dir="u"/>
+  </p:transition>
+  <p:timing>
+    <p:tnLst>
+      <p:par>
+        <p:cTn id="1" dur="indefinite" restart="never" nodeType="tmRoot"/>
+      </p:par>
+    </p:tnLst>
+  </p:timing>
+</p:sld>
+</file>
+
+<file path=ppt/slides/slide7.xml><?xml version="1.0" encoding="utf-8"?>
+<p:sld xmlns:a="http://schemas.openxmlformats.org/drawingml/2006/main" xmlns:r="http://schemas.openxmlformats.org/officeDocument/2006/relationships" xmlns:p="http://schemas.openxmlformats.org/presentationml/2006/main">
+  <p:cSld>
+    <p:spTree>
+      <p:nvGrpSpPr>
+        <p:cNvPr id="1" name=""/>
+        <p:cNvGrpSpPr/>
+        <p:nvPr/>
+      </p:nvGrpSpPr>
+      <p:grpSpPr>
+        <a:xfrm>
+          <a:off x="0" y="0"/>
+          <a:ext cx="0" cy="0"/>
+          <a:chOff x="0" y="0"/>
+          <a:chExt cx="0" cy="0"/>
+        </a:xfrm>
+      </p:grpSpPr>
+      <p:sp>
+        <p:nvSpPr>
+          <p:cNvPr id="2" name="Titre 1"/>
+          <p:cNvSpPr>
+            <a:spLocks noGrp="1"/>
+          </p:cNvSpPr>
+          <p:nvPr>
+            <p:ph type="title"/>
+          </p:nvPr>
+        </p:nvSpPr>
+        <p:spPr>
+          <a:xfrm>
+            <a:off x="179512" y="274638"/>
+            <a:ext cx="8784976" cy="1143000"/>
+          </a:xfrm>
+        </p:spPr>
+        <p:txBody>
+          <a:bodyPr>
+            <a:normAutofit/>
+          </a:bodyPr>
+          <a:lstStyle/>
+          <a:p>
+            <a:pPr algn="ctr"/>
+            <a:r>
+              <a:rPr lang="en-GB" sz="3600" dirty="0" err="1" smtClean="0">
+                <a:solidFill>
+                  <a:schemeClr val="tx1">
+                    <a:lumMod val="65000"/>
+                    <a:lumOff val="35000"/>
+                  </a:schemeClr>
+                </a:solidFill>
+              </a:rPr>
+              <a:t>Accès</a:t>
+            </a:r>
+            <a:r>
+              <a:rPr lang="en-GB" sz="3600" dirty="0" smtClean="0">
+                <a:solidFill>
+                  <a:schemeClr val="tx1">
+                    <a:lumMod val="65000"/>
+                    <a:lumOff val="35000"/>
+                  </a:schemeClr>
+                </a:solidFill>
+              </a:rPr>
+              <a:t> à distance</a:t>
+            </a:r>
+            <a:endParaRPr lang="fr-FR" sz="3600" dirty="0"/>
+          </a:p>
+        </p:txBody>
+      </p:sp>
+      <p:sp>
+        <p:nvSpPr>
+          <p:cNvPr id="4" name="Espace réservé du numéro de diapositive 3"/>
+          <p:cNvSpPr>
+            <a:spLocks noGrp="1"/>
+          </p:cNvSpPr>
+          <p:nvPr>
+            <p:ph type="sldNum" sz="quarter" idx="12"/>
+          </p:nvPr>
+        </p:nvSpPr>
+        <p:spPr/>
+        <p:txBody>
+          <a:bodyPr/>
+          <a:lstStyle/>
+          <a:p>
+            <a:fld id="{C7CDC3F6-687D-4FBA-B21C-72B0B0E094F4}" type="slidenum">
+              <a:rPr lang="fr-FR" smtClean="0"/>
+              <a:pPr/>
+              <a:t>7</a:t>
+            </a:fld>
+            <a:r>
+              <a:rPr lang="fr-FR" dirty="0" smtClean="0"/>
+              <a:t>/7</a:t>
+            </a:r>
+            <a:endParaRPr lang="fr-FR" dirty="0"/>
+          </a:p>
+        </p:txBody>
+      </p:sp>
+      <p:sp>
+        <p:nvSpPr>
+          <p:cNvPr id="3" name="Espace réservé du contenu 2"/>
+          <p:cNvSpPr>
+            <a:spLocks noGrp="1"/>
+          </p:cNvSpPr>
+          <p:nvPr>
+            <p:ph sz="quarter" idx="1"/>
+          </p:nvPr>
+        </p:nvSpPr>
+        <p:spPr/>
+        <p:txBody>
+          <a:bodyPr/>
+          <a:lstStyle/>
+          <a:p>
+            <a:pPr>
+              <a:buFont typeface="Arial" charset="0"/>
+              <a:buChar char="•"/>
+            </a:pPr>
+            <a:r>
+              <a:rPr lang="fr-FR" dirty="0" smtClean="0"/>
+              <a:t>Accéder </a:t>
+            </a:r>
+            <a:r>
+              <a:rPr lang="fr-FR" dirty="0" smtClean="0"/>
+              <a:t>à la page web : </a:t>
+            </a:r>
+            <a:endParaRPr lang="fr-FR" dirty="0" smtClean="0"/>
+          </a:p>
+          <a:p>
+            <a:pPr marL="0" indent="0" algn="ctr">
+              <a:buNone/>
+            </a:pPr>
+            <a:r>
+              <a:rPr lang="fr-FR" dirty="0" smtClean="0">
+                <a:hlinkClick r:id="rId3"/>
+              </a:rPr>
+              <a:t>http://rbcc.northrain.org/projet-rd</a:t>
+            </a:r>
+            <a:endParaRPr lang="fr-FR" dirty="0" smtClean="0"/>
+          </a:p>
+          <a:p>
+            <a:pPr marL="0" indent="0" algn="ctr">
+              <a:buNone/>
+            </a:pPr>
+            <a:endParaRPr lang="fr-FR" dirty="0" smtClean="0"/>
+          </a:p>
+          <a:p>
+            <a:pPr marL="0" indent="0" algn="ctr">
+              <a:buNone/>
+            </a:pPr>
+            <a:endParaRPr lang="fr-FR" dirty="0" smtClean="0"/>
+          </a:p>
+          <a:p>
+            <a:pPr marL="0" indent="0" algn="ctr">
+              <a:buNone/>
+            </a:pPr>
+            <a:endParaRPr lang="fr-FR" dirty="0"/>
+          </a:p>
+        </p:txBody>
+      </p:sp>
+    </p:spTree>
+    <p:extLst>
+      <p:ext uri="{BB962C8B-B14F-4D97-AF65-F5344CB8AC3E}">
+        <p14:creationId xmlns:p14="http://schemas.microsoft.com/office/powerpoint/2010/main" val="3573934456"/>
+      </p:ext>
+    </p:extLst>
+  </p:cSld>
+  <p:clrMapOvr>
+    <a:masterClrMapping/>
+  </p:clrMapOvr>
+  <p:transition spd="slow">
+    <p:push dir="u"/>
+  </p:transition>
   <p:timing>
     <p:tnLst>
       <p:par>

</xml_diff>